<commit_message>
new db with train data
</commit_message>
<xml_diff>
--- a/proj-mgmt/project-layout.pptx
+++ b/proj-mgmt/project-layout.pptx
@@ -7,6 +7,7 @@
   <p:sldIdLst>
     <p:sldId id="256" r:id="rId2"/>
     <p:sldId id="257" r:id="rId3"/>
+    <p:sldId id="258" r:id="rId4"/>
   </p:sldIdLst>
   <p:sldSz cx="12192000" cy="6858000"/>
   <p:notesSz cx="7315200" cy="9601200"/>
@@ -3788,7 +3789,7 @@
         </p:nvSpPr>
         <p:spPr>
           <a:xfrm>
-            <a:off x="9554730" y="3957063"/>
+            <a:off x="8738652" y="5451566"/>
             <a:ext cx="2015608" cy="855407"/>
           </a:xfrm>
           <a:prstGeom prst="rect">
@@ -3855,7 +3856,7 @@
         <p:spPr>
           <a:xfrm>
             <a:off x="8606752" y="3676428"/>
-            <a:ext cx="947978" cy="708339"/>
+            <a:ext cx="131900" cy="2202842"/>
           </a:xfrm>
           <a:prstGeom prst="straightConnector1">
             <a:avLst/>
@@ -4017,7 +4018,7 @@
         <p:spPr>
           <a:xfrm>
             <a:off x="5909000" y="4372815"/>
-            <a:ext cx="3645730" cy="11952"/>
+            <a:ext cx="2829652" cy="1506455"/>
           </a:xfrm>
           <a:prstGeom prst="straightConnector1">
             <a:avLst/>
@@ -4042,6 +4043,61 @@
           </a:fontRef>
         </p:style>
       </p:cxnSp>
+      <p:sp>
+        <p:nvSpPr>
+          <p:cNvPr id="6" name="Rectangle 5">
+            <a:extLst>
+              <a:ext uri="{FF2B5EF4-FFF2-40B4-BE49-F238E27FC236}">
+                <a16:creationId xmlns:a16="http://schemas.microsoft.com/office/drawing/2014/main" id="{6B45705A-C026-6AF9-9AAD-5D7EAFBE1BD5}"/>
+              </a:ext>
+            </a:extLst>
+          </p:cNvPr>
+          <p:cNvSpPr/>
+          <p:nvPr/>
+        </p:nvSpPr>
+        <p:spPr>
+          <a:xfrm>
+            <a:off x="9530149" y="2573593"/>
+            <a:ext cx="2015608" cy="855407"/>
+          </a:xfrm>
+          <a:prstGeom prst="rect">
+            <a:avLst/>
+          </a:prstGeom>
+          <a:solidFill>
+            <a:schemeClr val="accent1">
+              <a:lumMod val="60000"/>
+              <a:lumOff val="40000"/>
+            </a:schemeClr>
+          </a:solidFill>
+        </p:spPr>
+        <p:style>
+          <a:lnRef idx="2">
+            <a:schemeClr val="accent1">
+              <a:shade val="15000"/>
+            </a:schemeClr>
+          </a:lnRef>
+          <a:fillRef idx="1">
+            <a:schemeClr val="accent1"/>
+          </a:fillRef>
+          <a:effectRef idx="0">
+            <a:schemeClr val="accent1"/>
+          </a:effectRef>
+          <a:fontRef idx="minor">
+            <a:schemeClr val="lt1"/>
+          </a:fontRef>
+        </p:style>
+        <p:txBody>
+          <a:bodyPr rtlCol="0" anchor="ctr"/>
+          <a:lstStyle/>
+          <a:p>
+            <a:pPr algn="ctr"/>
+            <a:r>
+              <a:rPr lang="en-US" dirty="0"/>
+              <a:t>Tableau</a:t>
+            </a:r>
+          </a:p>
+        </p:txBody>
+      </p:sp>
     </p:spTree>
     <p:extLst>
       <p:ext uri="{BB962C8B-B14F-4D97-AF65-F5344CB8AC3E}">
@@ -4230,13 +4286,16 @@
               <a:rPr lang="en-US" dirty="0"/>
               <a:t> = Column(Integer)    </a:t>
             </a:r>
+          </a:p>
+          <a:p>
+            <a:pPr algn="ctr"/>
             <a:r>
               <a:rPr lang="en-US" dirty="0" err="1"/>
               <a:t>zipcode</a:t>
             </a:r>
             <a:r>
               <a:rPr lang="en-US" dirty="0"/>
-              <a:t> = Column(String)    type = Column(String)    </a:t>
+              <a:t> = Column(String)    </a:t>
             </a:r>
           </a:p>
           <a:p>
@@ -4262,7 +4321,7 @@
         </p:nvSpPr>
         <p:spPr>
           <a:xfrm>
-            <a:off x="7086601" y="3429000"/>
+            <a:off x="7555177" y="330372"/>
             <a:ext cx="4121036" cy="3139321"/>
           </a:xfrm>
           <a:prstGeom prst="rect">
@@ -4369,10 +4428,315 @@
           </a:p>
         </p:txBody>
       </p:sp>
+      <p:sp>
+        <p:nvSpPr>
+          <p:cNvPr id="2" name="TextBox 1">
+            <a:extLst>
+              <a:ext uri="{FF2B5EF4-FFF2-40B4-BE49-F238E27FC236}">
+                <a16:creationId xmlns:a16="http://schemas.microsoft.com/office/drawing/2014/main" id="{E0D5EC9A-C9C6-E299-DC9C-D6D6E5370F6D}"/>
+              </a:ext>
+            </a:extLst>
+          </p:cNvPr>
+          <p:cNvSpPr txBox="1"/>
+          <p:nvPr/>
+        </p:nvSpPr>
+        <p:spPr>
+          <a:xfrm>
+            <a:off x="6096000" y="4219304"/>
+            <a:ext cx="4498663" cy="2308324"/>
+          </a:xfrm>
+          <a:prstGeom prst="rect">
+            <a:avLst/>
+          </a:prstGeom>
+          <a:noFill/>
+          <a:ln>
+            <a:solidFill>
+              <a:schemeClr val="tx1"/>
+            </a:solidFill>
+          </a:ln>
+        </p:spPr>
+        <p:txBody>
+          <a:bodyPr wrap="square" rtlCol="0">
+            <a:spAutoFit/>
+          </a:bodyPr>
+          <a:lstStyle/>
+          <a:p>
+            <a:pPr algn="ctr"/>
+            <a:r>
+              <a:rPr lang="en-US" u="sng" dirty="0" err="1"/>
+              <a:t>listed_data</a:t>
+            </a:r>
+            <a:endParaRPr lang="en-US" u="sng" dirty="0"/>
+          </a:p>
+          <a:p>
+            <a:pPr algn="ctr"/>
+            <a:r>
+              <a:rPr lang="en-US" dirty="0"/>
+              <a:t>id = Column(Integer, </a:t>
+            </a:r>
+            <a:r>
+              <a:rPr lang="en-US" dirty="0" err="1"/>
+              <a:t>primary_key</a:t>
+            </a:r>
+            <a:r>
+              <a:rPr lang="en-US" dirty="0"/>
+              <a:t>=True)   </a:t>
+            </a:r>
+          </a:p>
+          <a:p>
+            <a:pPr algn="ctr"/>
+            <a:r>
+              <a:rPr lang="en-US" dirty="0"/>
+              <a:t>beds = Column(Integer)    </a:t>
+            </a:r>
+          </a:p>
+          <a:p>
+            <a:pPr algn="ctr"/>
+            <a:r>
+              <a:rPr lang="en-US" dirty="0"/>
+              <a:t>baths = Column(Integer)    </a:t>
+            </a:r>
+          </a:p>
+          <a:p>
+            <a:pPr algn="ctr"/>
+            <a:r>
+              <a:rPr lang="en-US" dirty="0" err="1"/>
+              <a:t>sqft</a:t>
+            </a:r>
+            <a:r>
+              <a:rPr lang="en-US" dirty="0"/>
+              <a:t> = Column(Integer)    </a:t>
+            </a:r>
+          </a:p>
+          <a:p>
+            <a:pPr algn="ctr"/>
+            <a:r>
+              <a:rPr lang="en-US" dirty="0" err="1"/>
+              <a:t>zipcode</a:t>
+            </a:r>
+            <a:r>
+              <a:rPr lang="en-US" dirty="0"/>
+              <a:t> = Column(String)    </a:t>
+            </a:r>
+          </a:p>
+          <a:p>
+            <a:pPr algn="ctr"/>
+            <a:r>
+              <a:rPr lang="en-US" dirty="0" err="1"/>
+              <a:t>Listed_price</a:t>
+            </a:r>
+            <a:endParaRPr lang="en-US" dirty="0"/>
+          </a:p>
+          <a:p>
+            <a:pPr algn="ctr"/>
+            <a:r>
+              <a:rPr lang="en-US" dirty="0" err="1"/>
+              <a:t>Predicted_price</a:t>
+            </a:r>
+            <a:r>
+              <a:rPr lang="en-US" dirty="0"/>
+              <a:t> = Column(Integer)</a:t>
+            </a:r>
+          </a:p>
+        </p:txBody>
+      </p:sp>
     </p:spTree>
     <p:extLst>
       <p:ext uri="{BB962C8B-B14F-4D97-AF65-F5344CB8AC3E}">
         <p14:creationId xmlns:p14="http://schemas.microsoft.com/office/powerpoint/2010/main" val="4059126566"/>
+      </p:ext>
+    </p:extLst>
+  </p:cSld>
+  <p:clrMapOvr>
+    <a:masterClrMapping/>
+  </p:clrMapOvr>
+</p:sld>
+</file>
+
+<file path=ppt/slides/slide3.xml><?xml version="1.0" encoding="utf-8"?>
+<p:sld xmlns:a="http://schemas.openxmlformats.org/drawingml/2006/main" xmlns:r="http://schemas.openxmlformats.org/officeDocument/2006/relationships" xmlns:p="http://schemas.openxmlformats.org/presentationml/2006/main">
+  <p:cSld>
+    <p:spTree>
+      <p:nvGrpSpPr>
+        <p:cNvPr id="1" name=""/>
+        <p:cNvGrpSpPr/>
+        <p:nvPr/>
+      </p:nvGrpSpPr>
+      <p:grpSpPr>
+        <a:xfrm>
+          <a:off x="0" y="0"/>
+          <a:ext cx="0" cy="0"/>
+          <a:chOff x="0" y="0"/>
+          <a:chExt cx="0" cy="0"/>
+        </a:xfrm>
+      </p:grpSpPr>
+      <p:sp>
+        <p:nvSpPr>
+          <p:cNvPr id="4" name="TextBox 3">
+            <a:extLst>
+              <a:ext uri="{FF2B5EF4-FFF2-40B4-BE49-F238E27FC236}">
+                <a16:creationId xmlns:a16="http://schemas.microsoft.com/office/drawing/2014/main" id="{CC3AE73D-82BA-825E-EACF-AC4206142470}"/>
+              </a:ext>
+            </a:extLst>
+          </p:cNvPr>
+          <p:cNvSpPr txBox="1"/>
+          <p:nvPr/>
+        </p:nvSpPr>
+        <p:spPr>
+          <a:xfrm>
+            <a:off x="525619" y="291043"/>
+            <a:ext cx="6130637" cy="1477328"/>
+          </a:xfrm>
+          <a:prstGeom prst="rect">
+            <a:avLst/>
+          </a:prstGeom>
+          <a:noFill/>
+          <a:ln>
+            <a:solidFill>
+              <a:schemeClr val="tx1"/>
+            </a:solidFill>
+          </a:ln>
+        </p:spPr>
+        <p:txBody>
+          <a:bodyPr wrap="square" rtlCol="0">
+            <a:spAutoFit/>
+          </a:bodyPr>
+          <a:lstStyle/>
+          <a:p>
+            <a:r>
+              <a:rPr lang="en-US" u="sng" dirty="0"/>
+              <a:t>Train against sold data (790 homes)</a:t>
+            </a:r>
+          </a:p>
+          <a:p>
+            <a:endParaRPr lang="en-US" u="sng" dirty="0"/>
+          </a:p>
+          <a:p>
+            <a:r>
+              <a:rPr lang="en-US" u="sng" dirty="0"/>
+              <a:t>Run listed homes (527 homes) – predicted price. </a:t>
+            </a:r>
+          </a:p>
+          <a:p>
+            <a:endParaRPr lang="en-US" u="sng" dirty="0"/>
+          </a:p>
+          <a:p>
+            <a:r>
+              <a:rPr lang="en-US" u="sng" dirty="0"/>
+              <a:t>Compare predicted</a:t>
+            </a:r>
+            <a:endParaRPr lang="en-US" dirty="0"/>
+          </a:p>
+        </p:txBody>
+      </p:sp>
+      <p:sp>
+        <p:nvSpPr>
+          <p:cNvPr id="6" name="TextBox 5">
+            <a:extLst>
+              <a:ext uri="{FF2B5EF4-FFF2-40B4-BE49-F238E27FC236}">
+                <a16:creationId xmlns:a16="http://schemas.microsoft.com/office/drawing/2014/main" id="{E640FCA0-5D5E-C6EF-0369-BC7E7084CB04}"/>
+              </a:ext>
+            </a:extLst>
+          </p:cNvPr>
+          <p:cNvSpPr txBox="1"/>
+          <p:nvPr/>
+        </p:nvSpPr>
+        <p:spPr>
+          <a:xfrm>
+            <a:off x="1503928" y="2505670"/>
+            <a:ext cx="6130637" cy="923330"/>
+          </a:xfrm>
+          <a:prstGeom prst="rect">
+            <a:avLst/>
+          </a:prstGeom>
+          <a:noFill/>
+          <a:ln>
+            <a:solidFill>
+              <a:schemeClr val="tx1"/>
+            </a:solidFill>
+          </a:ln>
+        </p:spPr>
+        <p:txBody>
+          <a:bodyPr wrap="square" rtlCol="0">
+            <a:spAutoFit/>
+          </a:bodyPr>
+          <a:lstStyle/>
+          <a:p>
+            <a:pPr lvl="1"/>
+            <a:r>
+              <a:rPr lang="en-US" dirty="0"/>
+              <a:t>85001, 85005, 85010, 85200</a:t>
+            </a:r>
+          </a:p>
+          <a:p>
+            <a:pPr lvl="1"/>
+            <a:r>
+              <a:rPr lang="en-US" dirty="0"/>
+              <a:t>1, 2,3,4 </a:t>
+            </a:r>
+          </a:p>
+          <a:p>
+            <a:pPr lvl="1"/>
+            <a:endParaRPr lang="en-US" dirty="0"/>
+          </a:p>
+        </p:txBody>
+      </p:sp>
+      <p:sp>
+        <p:nvSpPr>
+          <p:cNvPr id="7" name="TextBox 6">
+            <a:extLst>
+              <a:ext uri="{FF2B5EF4-FFF2-40B4-BE49-F238E27FC236}">
+                <a16:creationId xmlns:a16="http://schemas.microsoft.com/office/drawing/2014/main" id="{0DC213D7-1724-BFE4-6152-D4A4EE00D032}"/>
+              </a:ext>
+            </a:extLst>
+          </p:cNvPr>
+          <p:cNvSpPr txBox="1"/>
+          <p:nvPr/>
+        </p:nvSpPr>
+        <p:spPr>
+          <a:xfrm>
+            <a:off x="7752552" y="2825218"/>
+            <a:ext cx="4233195" cy="923330"/>
+          </a:xfrm>
+          <a:prstGeom prst="rect">
+            <a:avLst/>
+          </a:prstGeom>
+          <a:noFill/>
+          <a:ln>
+            <a:solidFill>
+              <a:schemeClr val="tx1"/>
+            </a:solidFill>
+          </a:ln>
+        </p:spPr>
+        <p:txBody>
+          <a:bodyPr wrap="square" rtlCol="0">
+            <a:spAutoFit/>
+          </a:bodyPr>
+          <a:lstStyle/>
+          <a:p>
+            <a:pPr lvl="1"/>
+            <a:r>
+              <a:rPr lang="en-US" dirty="0"/>
+              <a:t>85007</a:t>
+            </a:r>
+          </a:p>
+          <a:p>
+            <a:pPr lvl="1"/>
+            <a:r>
+              <a:rPr lang="en-US" dirty="0"/>
+              <a:t>3</a:t>
+            </a:r>
+          </a:p>
+          <a:p>
+            <a:pPr lvl="1"/>
+            <a:endParaRPr lang="en-US" dirty="0"/>
+          </a:p>
+        </p:txBody>
+      </p:sp>
+    </p:spTree>
+    <p:extLst>
+      <p:ext uri="{BB962C8B-B14F-4D97-AF65-F5344CB8AC3E}">
+        <p14:creationId xmlns:p14="http://schemas.microsoft.com/office/powerpoint/2010/main" val="3226865519"/>
       </p:ext>
     </p:extLst>
   </p:cSld>

</xml_diff>